<commit_message>
fixed timing waveform pic
</commit_message>
<xml_diff>
--- a/doc/aflp_kurs_gorbunova_presentation.pptx
+++ b/doc/aflp_kurs_gorbunova_presentation.pptx
@@ -111,6 +111,11 @@
       </a:defRPr>
     </a:lvl9pPr>
   </p:defaultTextStyle>
+  <p:extLst>
+    <p:ext uri="{EFAFB233-063F-42B5-8137-9DF3F51BA10A}">
+      <p15:sldGuideLst xmlns:p15="http://schemas.microsoft.com/office/powerpoint/2012/main"/>
+    </p:ext>
+  </p:extLst>
 </p:presentation>
 </file>
 
@@ -245,7 +250,7 @@
           <a:p>
             <a:fld id="{64A949E2-22A3-42C3-A702-5F74138CBB98}" type="datetimeFigureOut">
               <a:rPr lang="ru-RU" smtClean="0"/>
-              <a:t>19.01.2023</a:t>
+              <a:t>20.01.2023</a:t>
             </a:fld>
             <a:endParaRPr lang="ru-RU"/>
           </a:p>
@@ -415,7 +420,7 @@
           <a:p>
             <a:fld id="{64A949E2-22A3-42C3-A702-5F74138CBB98}" type="datetimeFigureOut">
               <a:rPr lang="ru-RU" smtClean="0"/>
-              <a:t>19.01.2023</a:t>
+              <a:t>20.01.2023</a:t>
             </a:fld>
             <a:endParaRPr lang="ru-RU"/>
           </a:p>
@@ -595,7 +600,7 @@
           <a:p>
             <a:fld id="{64A949E2-22A3-42C3-A702-5F74138CBB98}" type="datetimeFigureOut">
               <a:rPr lang="ru-RU" smtClean="0"/>
-              <a:t>19.01.2023</a:t>
+              <a:t>20.01.2023</a:t>
             </a:fld>
             <a:endParaRPr lang="ru-RU"/>
           </a:p>
@@ -765,7 +770,7 @@
           <a:p>
             <a:fld id="{64A949E2-22A3-42C3-A702-5F74138CBB98}" type="datetimeFigureOut">
               <a:rPr lang="ru-RU" smtClean="0"/>
-              <a:t>19.01.2023</a:t>
+              <a:t>20.01.2023</a:t>
             </a:fld>
             <a:endParaRPr lang="ru-RU"/>
           </a:p>
@@ -1011,7 +1016,7 @@
           <a:p>
             <a:fld id="{64A949E2-22A3-42C3-A702-5F74138CBB98}" type="datetimeFigureOut">
               <a:rPr lang="ru-RU" smtClean="0"/>
-              <a:t>19.01.2023</a:t>
+              <a:t>20.01.2023</a:t>
             </a:fld>
             <a:endParaRPr lang="ru-RU"/>
           </a:p>
@@ -1243,7 +1248,7 @@
           <a:p>
             <a:fld id="{64A949E2-22A3-42C3-A702-5F74138CBB98}" type="datetimeFigureOut">
               <a:rPr lang="ru-RU" smtClean="0"/>
-              <a:t>19.01.2023</a:t>
+              <a:t>20.01.2023</a:t>
             </a:fld>
             <a:endParaRPr lang="ru-RU"/>
           </a:p>
@@ -1610,7 +1615,7 @@
           <a:p>
             <a:fld id="{64A949E2-22A3-42C3-A702-5F74138CBB98}" type="datetimeFigureOut">
               <a:rPr lang="ru-RU" smtClean="0"/>
-              <a:t>19.01.2023</a:t>
+              <a:t>20.01.2023</a:t>
             </a:fld>
             <a:endParaRPr lang="ru-RU"/>
           </a:p>
@@ -1728,7 +1733,7 @@
           <a:p>
             <a:fld id="{64A949E2-22A3-42C3-A702-5F74138CBB98}" type="datetimeFigureOut">
               <a:rPr lang="ru-RU" smtClean="0"/>
-              <a:t>19.01.2023</a:t>
+              <a:t>20.01.2023</a:t>
             </a:fld>
             <a:endParaRPr lang="ru-RU"/>
           </a:p>
@@ -1823,7 +1828,7 @@
           <a:p>
             <a:fld id="{64A949E2-22A3-42C3-A702-5F74138CBB98}" type="datetimeFigureOut">
               <a:rPr lang="ru-RU" smtClean="0"/>
-              <a:t>19.01.2023</a:t>
+              <a:t>20.01.2023</a:t>
             </a:fld>
             <a:endParaRPr lang="ru-RU"/>
           </a:p>
@@ -2100,7 +2105,7 @@
           <a:p>
             <a:fld id="{64A949E2-22A3-42C3-A702-5F74138CBB98}" type="datetimeFigureOut">
               <a:rPr lang="ru-RU" smtClean="0"/>
-              <a:t>19.01.2023</a:t>
+              <a:t>20.01.2023</a:t>
             </a:fld>
             <a:endParaRPr lang="ru-RU"/>
           </a:p>
@@ -2353,7 +2358,7 @@
           <a:p>
             <a:fld id="{64A949E2-22A3-42C3-A702-5F74138CBB98}" type="datetimeFigureOut">
               <a:rPr lang="ru-RU" smtClean="0"/>
-              <a:t>19.01.2023</a:t>
+              <a:t>20.01.2023</a:t>
             </a:fld>
             <a:endParaRPr lang="ru-RU"/>
           </a:p>
@@ -2566,7 +2571,7 @@
           <a:p>
             <a:fld id="{64A949E2-22A3-42C3-A702-5F74138CBB98}" type="datetimeFigureOut">
               <a:rPr lang="ru-RU" smtClean="0"/>
-              <a:t>19.01.2023</a:t>
+              <a:t>20.01.2023</a:t>
             </a:fld>
             <a:endParaRPr lang="ru-RU"/>
           </a:p>
@@ -3200,14 +3205,7 @@
                 <a:latin typeface="Times New Roman" panose="02020603050405020304" pitchFamily="18" charset="0"/>
                 <a:cs typeface="Times New Roman" panose="02020603050405020304" pitchFamily="18" charset="0"/>
               </a:rPr>
-              <a:t>Год </a:t>
-            </a:r>
-            <a:r>
-              <a:rPr lang="ru-RU" sz="2400" dirty="0" smtClean="0">
-                <a:latin typeface="Times New Roman" panose="02020603050405020304" pitchFamily="18" charset="0"/>
-                <a:cs typeface="Times New Roman" panose="02020603050405020304" pitchFamily="18" charset="0"/>
-              </a:rPr>
-              <a:t>2023</a:t>
+              <a:t>Год 2023</a:t>
             </a:r>
             <a:endParaRPr lang="ru-RU" sz="2400" dirty="0">
               <a:latin typeface="Times New Roman" panose="02020603050405020304" pitchFamily="18" charset="0"/>
@@ -3499,13 +3497,6 @@
               </a:rPr>
               <a:t>2</a:t>
             </a:r>
-            <a:endParaRPr lang="ru-RU" sz="1400" dirty="0">
-              <a:solidFill>
-                <a:schemeClr val="tx1"/>
-              </a:solidFill>
-              <a:latin typeface="Times New Roman" panose="02020603050405020304" pitchFamily="18" charset="0"/>
-              <a:cs typeface="Times New Roman" panose="02020603050405020304" pitchFamily="18" charset="0"/>
-            </a:endParaRPr>
           </a:p>
         </p:txBody>
       </p:sp>
@@ -4831,13 +4822,6 @@
               </a:rPr>
               <a:t>3</a:t>
             </a:r>
-            <a:endParaRPr lang="ru-RU" sz="1400" dirty="0">
-              <a:solidFill>
-                <a:schemeClr val="tx1"/>
-              </a:solidFill>
-              <a:latin typeface="Times New Roman" panose="02020603050405020304" pitchFamily="18" charset="0"/>
-              <a:cs typeface="Times New Roman" panose="02020603050405020304" pitchFamily="18" charset="0"/>
-            </a:endParaRPr>
           </a:p>
         </p:txBody>
       </p:sp>
@@ -6449,13 +6433,6 @@
               </a:rPr>
               <a:t>5</a:t>
             </a:r>
-            <a:endParaRPr lang="ru-RU" sz="1400" dirty="0">
-              <a:solidFill>
-                <a:schemeClr val="tx1"/>
-              </a:solidFill>
-              <a:latin typeface="Times New Roman" panose="02020603050405020304" pitchFamily="18" charset="0"/>
-              <a:cs typeface="Times New Roman" panose="02020603050405020304" pitchFamily="18" charset="0"/>
-            </a:endParaRPr>
           </a:p>
         </p:txBody>
       </p:sp>
@@ -6740,36 +6717,6 @@
       </p:sp>
       <p:pic>
         <p:nvPicPr>
-          <p:cNvPr id="4" name="Рисунок 3"/>
-          <p:cNvPicPr>
-            <a:picLocks noChangeAspect="1"/>
-          </p:cNvPicPr>
-          <p:nvPr/>
-        </p:nvPicPr>
-        <p:blipFill>
-          <a:blip r:embed="rId2">
-            <a:extLst>
-              <a:ext uri="{28A0092B-C50C-407E-A947-70E740481C1C}">
-                <a14:useLocalDpi xmlns:a14="http://schemas.microsoft.com/office/drawing/2010/main" val="0"/>
-              </a:ext>
-            </a:extLst>
-          </a:blip>
-          <a:stretch>
-            <a:fillRect/>
-          </a:stretch>
-        </p:blipFill>
-        <p:spPr>
-          <a:xfrm>
-            <a:off x="2005033" y="553673"/>
-            <a:ext cx="7967399" cy="6273019"/>
-          </a:xfrm>
-          <a:prstGeom prst="rect">
-            <a:avLst/>
-          </a:prstGeom>
-        </p:spPr>
-      </p:pic>
-      <p:pic>
-        <p:nvPicPr>
           <p:cNvPr id="5" name="Рисунок 4" descr="aAz6ZvjSVW0.jpg"/>
           <p:cNvPicPr>
             <a:picLocks noChangeAspect="1"/>
@@ -6777,7 +6724,7 @@
           <p:nvPr/>
         </p:nvPicPr>
         <p:blipFill>
-          <a:blip r:embed="rId3" cstate="print"/>
+          <a:blip r:embed="rId2" cstate="print"/>
           <a:stretch>
             <a:fillRect/>
           </a:stretch>
@@ -6822,16 +6769,39 @@
               </a:rPr>
               <a:t>7</a:t>
             </a:r>
-            <a:endParaRPr lang="ru-RU" sz="1400" dirty="0">
-              <a:solidFill>
-                <a:schemeClr val="tx1"/>
-              </a:solidFill>
-              <a:latin typeface="Times New Roman" panose="02020603050405020304" pitchFamily="18" charset="0"/>
-              <a:cs typeface="Times New Roman" panose="02020603050405020304" pitchFamily="18" charset="0"/>
-            </a:endParaRPr>
-          </a:p>
-        </p:txBody>
-      </p:sp>
+          </a:p>
+        </p:txBody>
+      </p:sp>
+      <p:pic>
+        <p:nvPicPr>
+          <p:cNvPr id="3" name="Рисунок 2"/>
+          <p:cNvPicPr>
+            <a:picLocks noChangeAspect="1"/>
+          </p:cNvPicPr>
+          <p:nvPr/>
+        </p:nvPicPr>
+        <p:blipFill>
+          <a:blip r:embed="rId3">
+            <a:extLst>
+              <a:ext uri="{28A0092B-C50C-407E-A947-70E740481C1C}">
+                <a14:useLocalDpi xmlns:a14="http://schemas.microsoft.com/office/drawing/2010/main" val="0"/>
+              </a:ext>
+            </a:extLst>
+          </a:blip>
+          <a:stretch>
+            <a:fillRect/>
+          </a:stretch>
+        </p:blipFill>
+        <p:spPr>
+          <a:xfrm>
+            <a:off x="2281707" y="553673"/>
+            <a:ext cx="7628585" cy="6194228"/>
+          </a:xfrm>
+          <a:prstGeom prst="rect">
+            <a:avLst/>
+          </a:prstGeom>
+        </p:spPr>
+      </p:pic>
     </p:spTree>
     <p:extLst>
       <p:ext uri="{BB962C8B-B14F-4D97-AF65-F5344CB8AC3E}">

</xml_diff>